<commit_message>
added pie chart, edits to ppt
</commit_message>
<xml_diff>
--- a/Documents/Hotel Booking Prediction.pptx
+++ b/Documents/Hotel Booking Prediction.pptx
@@ -12030,10 +12030,10 @@
       </p:grpSpPr>
       <p:sp useBgFill="1">
         <p:nvSpPr>
-          <p:cNvPr id="12" name="Rectangle 11">
+          <p:cNvPr id="21" name="Rectangle 20">
             <a:extLst>
               <a:ext uri="{FF2B5EF4-FFF2-40B4-BE49-F238E27FC236}">
-                <a16:creationId xmlns:a16="http://schemas.microsoft.com/office/drawing/2014/main" id="{B2EC7880-C5D9-40A8-A6B0-3198AD07AD1B}"/>
+                <a16:creationId xmlns:a16="http://schemas.microsoft.com/office/drawing/2014/main" id="{3F4C104D-5F30-4811-9376-566B26E4719A}"/>
               </a:ext>
               <a:ext uri="{C183D7F6-B498-43B3-948B-1728B52AA6E4}">
                 <adec:decorative xmlns:adec="http://schemas.microsoft.com/office/drawing/2017/decorative" val="1"/>
@@ -12125,10 +12125,10 @@
       </p:sp>
       <p:sp>
         <p:nvSpPr>
-          <p:cNvPr id="14" name="Rectangle 13">
+          <p:cNvPr id="23" name="Rectangle 22">
             <a:extLst>
               <a:ext uri="{FF2B5EF4-FFF2-40B4-BE49-F238E27FC236}">
-                <a16:creationId xmlns:a16="http://schemas.microsoft.com/office/drawing/2014/main" id="{94543A62-A2AB-454A-878E-D3D9190D5FC7}"/>
+                <a16:creationId xmlns:a16="http://schemas.microsoft.com/office/drawing/2014/main" id="{0815E34B-5D02-4E01-A936-E8E1C0AB6F12}"/>
               </a:ext>
               <a:ext uri="{C183D7F6-B498-43B3-948B-1728B52AA6E4}">
                 <adec:decorative xmlns:adec="http://schemas.microsoft.com/office/drawing/2017/decorative" val="1"/>
@@ -12289,10 +12289,10 @@
       </p:sp>
       <p:pic>
         <p:nvPicPr>
-          <p:cNvPr id="5" name="Picture 4" descr="A graph on a black background&#10;&#10;Description automatically generated">
+          <p:cNvPr id="4" name="Picture 3" descr="A graph of a hotel type&#10;&#10;Description automatically generated">
             <a:extLst>
               <a:ext uri="{FF2B5EF4-FFF2-40B4-BE49-F238E27FC236}">
-                <a16:creationId xmlns:a16="http://schemas.microsoft.com/office/drawing/2014/main" id="{FB2FA702-FFBF-7287-EF86-1AF745D43BB4}"/>
+                <a16:creationId xmlns:a16="http://schemas.microsoft.com/office/drawing/2014/main" id="{E0D940B9-A5A0-BA2D-03B6-A11C6331CBCE}"/>
               </a:ext>
             </a:extLst>
           </p:cNvPr>
@@ -12301,7 +12301,7 @@
           </p:cNvPicPr>
           <p:nvPr/>
         </p:nvPicPr>
-        <p:blipFill rotWithShape="1">
+        <p:blipFill>
           <a:blip r:embed="rId2">
             <a:extLst>
               <a:ext uri="{28A0092B-C50C-407E-A947-70E740481C1C}">
@@ -12309,13 +12309,14 @@
               </a:ext>
             </a:extLst>
           </a:blip>
-          <a:srcRect r="44069" b="-2"/>
-          <a:stretch/>
+          <a:stretch>
+            <a:fillRect/>
+          </a:stretch>
         </p:blipFill>
         <p:spPr>
           <a:xfrm>
-            <a:off x="4619543" y="640080"/>
-            <a:ext cx="6953577" cy="5252773"/>
+            <a:off x="5685892" y="640080"/>
+            <a:ext cx="5337150" cy="5252773"/>
           </a:xfrm>
           <a:prstGeom prst="rect">
             <a:avLst/>
@@ -12324,10 +12325,10 @@
       </p:pic>
       <p:sp>
         <p:nvSpPr>
-          <p:cNvPr id="16" name="Freeform 11">
+          <p:cNvPr id="25" name="Freeform 11">
             <a:extLst>
               <a:ext uri="{FF2B5EF4-FFF2-40B4-BE49-F238E27FC236}">
-                <a16:creationId xmlns:a16="http://schemas.microsoft.com/office/drawing/2014/main" id="{50553464-41F1-4160-9D02-7C5EC7013BDA}"/>
+                <a16:creationId xmlns:a16="http://schemas.microsoft.com/office/drawing/2014/main" id="{7DE3414B-B032-4710-A468-D3285E38C5FF}"/>
               </a:ext>
               <a:ext uri="{C183D7F6-B498-43B3-948B-1728B52AA6E4}">
                 <adec:decorative xmlns:adec="http://schemas.microsoft.com/office/drawing/2017/decorative" val="1"/>
@@ -17868,7 +17869,7 @@
         <p:spPr>
           <a:xfrm>
             <a:off x="1023935" y="2099791"/>
-            <a:ext cx="10144125" cy="4286250"/>
+            <a:ext cx="5818992" cy="4286250"/>
           </a:xfrm>
           <a:prstGeom prst="rect">
             <a:avLst/>
@@ -17920,6 +17921,42 @@
           </a:p>
         </p:txBody>
       </p:sp>
+      <p:pic>
+        <p:nvPicPr>
+          <p:cNvPr id="4" name="Picture 3" descr="A green and purple pie chart&#10;&#10;Description automatically generated">
+            <a:extLst>
+              <a:ext uri="{FF2B5EF4-FFF2-40B4-BE49-F238E27FC236}">
+                <a16:creationId xmlns:a16="http://schemas.microsoft.com/office/drawing/2014/main" id="{6F2BFCAD-CF86-F5AB-32D7-11459F335B3C}"/>
+              </a:ext>
+            </a:extLst>
+          </p:cNvPr>
+          <p:cNvPicPr>
+            <a:picLocks noChangeAspect="1"/>
+          </p:cNvPicPr>
+          <p:nvPr/>
+        </p:nvPicPr>
+        <p:blipFill>
+          <a:blip r:embed="rId3">
+            <a:extLst>
+              <a:ext uri="{28A0092B-C50C-407E-A947-70E740481C1C}">
+                <a14:useLocalDpi xmlns:a14="http://schemas.microsoft.com/office/drawing/2010/main" val="0"/>
+              </a:ext>
+            </a:extLst>
+          </a:blip>
+          <a:stretch>
+            <a:fillRect/>
+          </a:stretch>
+        </p:blipFill>
+        <p:spPr>
+          <a:xfrm>
+            <a:off x="6842927" y="2099791"/>
+            <a:ext cx="4325138" cy="4286250"/>
+          </a:xfrm>
+          <a:prstGeom prst="rect">
+            <a:avLst/>
+          </a:prstGeom>
+        </p:spPr>
+      </p:pic>
     </p:spTree>
     <p:extLst>
       <p:ext uri="{BB962C8B-B14F-4D97-AF65-F5344CB8AC3E}">

</xml_diff>